<commit_message>
BLYAT SUKA OKAZIVAETSYA NADO PODPISATI
</commit_message>
<xml_diff>
--- a/Дешифратор.pptx
+++ b/Дешифратор.pptx
@@ -2999,6 +2999,144 @@
           </a:prstGeom>
         </p:spPr>
       </p:pic>
+      <p:sp>
+        <p:nvSpPr>
+          <p:cNvPr id="2" name="Прямоугольник 1"/>
+          <p:cNvSpPr/>
+          <p:nvPr/>
+        </p:nvSpPr>
+        <p:spPr>
+          <a:xfrm>
+            <a:off x="3778370" y="3976778"/>
+            <a:ext cx="862642" cy="181154"/>
+          </a:xfrm>
+          <a:prstGeom prst="rect">
+            <a:avLst/>
+          </a:prstGeom>
+          <a:solidFill>
+            <a:schemeClr val="bg1"/>
+          </a:solidFill>
+        </p:spPr>
+        <p:style>
+          <a:lnRef idx="2">
+            <a:schemeClr val="accent1">
+              <a:shade val="50000"/>
+            </a:schemeClr>
+          </a:lnRef>
+          <a:fillRef idx="1">
+            <a:schemeClr val="accent1"/>
+          </a:fillRef>
+          <a:effectRef idx="0">
+            <a:schemeClr val="accent1"/>
+          </a:effectRef>
+          <a:fontRef idx="minor">
+            <a:schemeClr val="lt1"/>
+          </a:fontRef>
+        </p:style>
+        <p:txBody>
+          <a:bodyPr rtlCol="0" anchor="ctr"/>
+          <a:lstStyle/>
+          <a:p>
+            <a:pPr algn="ctr"/>
+            <a:r>
+              <a:rPr lang="ru-RU" sz="1200" dirty="0" smtClean="0">
+                <a:ln>
+                  <a:solidFill>
+                    <a:schemeClr val="tx1"/>
+                  </a:solidFill>
+                </a:ln>
+                <a:solidFill>
+                  <a:schemeClr val="accent1">
+                    <a:lumMod val="75000"/>
+                  </a:schemeClr>
+                </a:solidFill>
+              </a:rPr>
+              <a:t>Т-триггер</a:t>
+            </a:r>
+            <a:endParaRPr lang="ru-RU" sz="1200" dirty="0">
+              <a:ln>
+                <a:solidFill>
+                  <a:schemeClr val="tx1"/>
+                </a:solidFill>
+              </a:ln>
+              <a:solidFill>
+                <a:schemeClr val="accent1">
+                  <a:lumMod val="75000"/>
+                </a:schemeClr>
+              </a:solidFill>
+            </a:endParaRPr>
+          </a:p>
+        </p:txBody>
+      </p:sp>
+      <p:sp>
+        <p:nvSpPr>
+          <p:cNvPr id="4" name="Прямоугольник 3"/>
+          <p:cNvSpPr/>
+          <p:nvPr/>
+        </p:nvSpPr>
+        <p:spPr>
+          <a:xfrm>
+            <a:off x="5483525" y="3976778"/>
+            <a:ext cx="862642" cy="181154"/>
+          </a:xfrm>
+          <a:prstGeom prst="rect">
+            <a:avLst/>
+          </a:prstGeom>
+          <a:solidFill>
+            <a:schemeClr val="bg1"/>
+          </a:solidFill>
+        </p:spPr>
+        <p:style>
+          <a:lnRef idx="2">
+            <a:schemeClr val="accent1">
+              <a:shade val="50000"/>
+            </a:schemeClr>
+          </a:lnRef>
+          <a:fillRef idx="1">
+            <a:schemeClr val="accent1"/>
+          </a:fillRef>
+          <a:effectRef idx="0">
+            <a:schemeClr val="accent1"/>
+          </a:effectRef>
+          <a:fontRef idx="minor">
+            <a:schemeClr val="lt1"/>
+          </a:fontRef>
+        </p:style>
+        <p:txBody>
+          <a:bodyPr rtlCol="0" anchor="ctr"/>
+          <a:lstStyle/>
+          <a:p>
+            <a:pPr algn="ctr"/>
+            <a:r>
+              <a:rPr lang="ru-RU" sz="1200" dirty="0" smtClean="0">
+                <a:ln>
+                  <a:solidFill>
+                    <a:schemeClr val="tx1"/>
+                  </a:solidFill>
+                </a:ln>
+                <a:solidFill>
+                  <a:schemeClr val="accent1">
+                    <a:lumMod val="75000"/>
+                  </a:schemeClr>
+                </a:solidFill>
+              </a:rPr>
+              <a:t>Т-триггер</a:t>
+            </a:r>
+            <a:endParaRPr lang="ru-RU" sz="1200" dirty="0">
+              <a:ln>
+                <a:solidFill>
+                  <a:schemeClr val="tx1"/>
+                </a:solidFill>
+              </a:ln>
+              <a:solidFill>
+                <a:schemeClr val="accent1">
+                  <a:lumMod val="75000"/>
+                </a:schemeClr>
+              </a:solidFill>
+            </a:endParaRPr>
+          </a:p>
+        </p:txBody>
+      </p:sp>
     </p:spTree>
     <p:extLst>
       <p:ext uri="{BB962C8B-B14F-4D97-AF65-F5344CB8AC3E}">
@@ -3265,6 +3403,144 @@
           </a:p>
         </p:txBody>
       </p:sp>
+      <p:sp>
+        <p:nvSpPr>
+          <p:cNvPr id="9" name="Прямоугольник 8"/>
+          <p:cNvSpPr/>
+          <p:nvPr/>
+        </p:nvSpPr>
+        <p:spPr>
+          <a:xfrm>
+            <a:off x="3666227" y="4095258"/>
+            <a:ext cx="862642" cy="181154"/>
+          </a:xfrm>
+          <a:prstGeom prst="rect">
+            <a:avLst/>
+          </a:prstGeom>
+          <a:solidFill>
+            <a:schemeClr val="bg1"/>
+          </a:solidFill>
+        </p:spPr>
+        <p:style>
+          <a:lnRef idx="2">
+            <a:schemeClr val="accent1">
+              <a:shade val="50000"/>
+            </a:schemeClr>
+          </a:lnRef>
+          <a:fillRef idx="1">
+            <a:schemeClr val="accent1"/>
+          </a:fillRef>
+          <a:effectRef idx="0">
+            <a:schemeClr val="accent1"/>
+          </a:effectRef>
+          <a:fontRef idx="minor">
+            <a:schemeClr val="lt1"/>
+          </a:fontRef>
+        </p:style>
+        <p:txBody>
+          <a:bodyPr rtlCol="0" anchor="ctr"/>
+          <a:lstStyle/>
+          <a:p>
+            <a:pPr algn="ctr"/>
+            <a:r>
+              <a:rPr lang="ru-RU" sz="1200" dirty="0" smtClean="0">
+                <a:ln>
+                  <a:solidFill>
+                    <a:schemeClr val="tx1"/>
+                  </a:solidFill>
+                </a:ln>
+                <a:solidFill>
+                  <a:schemeClr val="accent1">
+                    <a:lumMod val="75000"/>
+                  </a:schemeClr>
+                </a:solidFill>
+              </a:rPr>
+              <a:t>Т-триггер</a:t>
+            </a:r>
+            <a:endParaRPr lang="ru-RU" sz="1200" dirty="0">
+              <a:ln>
+                <a:solidFill>
+                  <a:schemeClr val="tx1"/>
+                </a:solidFill>
+              </a:ln>
+              <a:solidFill>
+                <a:schemeClr val="accent1">
+                  <a:lumMod val="75000"/>
+                </a:schemeClr>
+              </a:solidFill>
+            </a:endParaRPr>
+          </a:p>
+        </p:txBody>
+      </p:sp>
+      <p:sp>
+        <p:nvSpPr>
+          <p:cNvPr id="12" name="Прямоугольник 11"/>
+          <p:cNvSpPr/>
+          <p:nvPr/>
+        </p:nvSpPr>
+        <p:spPr>
+          <a:xfrm>
+            <a:off x="5337346" y="4157666"/>
+            <a:ext cx="862642" cy="181154"/>
+          </a:xfrm>
+          <a:prstGeom prst="rect">
+            <a:avLst/>
+          </a:prstGeom>
+          <a:solidFill>
+            <a:schemeClr val="bg1"/>
+          </a:solidFill>
+        </p:spPr>
+        <p:style>
+          <a:lnRef idx="2">
+            <a:schemeClr val="accent1">
+              <a:shade val="50000"/>
+            </a:schemeClr>
+          </a:lnRef>
+          <a:fillRef idx="1">
+            <a:schemeClr val="accent1"/>
+          </a:fillRef>
+          <a:effectRef idx="0">
+            <a:schemeClr val="accent1"/>
+          </a:effectRef>
+          <a:fontRef idx="minor">
+            <a:schemeClr val="lt1"/>
+          </a:fontRef>
+        </p:style>
+        <p:txBody>
+          <a:bodyPr rtlCol="0" anchor="ctr"/>
+          <a:lstStyle/>
+          <a:p>
+            <a:pPr algn="ctr"/>
+            <a:r>
+              <a:rPr lang="ru-RU" sz="1200" dirty="0" smtClean="0">
+                <a:ln>
+                  <a:solidFill>
+                    <a:schemeClr val="tx1"/>
+                  </a:solidFill>
+                </a:ln>
+                <a:solidFill>
+                  <a:schemeClr val="accent1">
+                    <a:lumMod val="75000"/>
+                  </a:schemeClr>
+                </a:solidFill>
+              </a:rPr>
+              <a:t>Т-триггер</a:t>
+            </a:r>
+            <a:endParaRPr lang="ru-RU" sz="1200" dirty="0">
+              <a:ln>
+                <a:solidFill>
+                  <a:schemeClr val="tx1"/>
+                </a:solidFill>
+              </a:ln>
+              <a:solidFill>
+                <a:schemeClr val="accent1">
+                  <a:lumMod val="75000"/>
+                </a:schemeClr>
+              </a:solidFill>
+            </a:endParaRPr>
+          </a:p>
+        </p:txBody>
+      </p:sp>
     </p:spTree>
     <p:extLst>
       <p:ext uri="{BB962C8B-B14F-4D97-AF65-F5344CB8AC3E}">
@@ -3512,6 +3788,144 @@
           </a:p>
         </p:txBody>
       </p:sp>
+      <p:sp>
+        <p:nvSpPr>
+          <p:cNvPr id="7" name="Прямоугольник 6"/>
+          <p:cNvSpPr/>
+          <p:nvPr/>
+        </p:nvSpPr>
+        <p:spPr>
+          <a:xfrm>
+            <a:off x="4002657" y="3961547"/>
+            <a:ext cx="862642" cy="181154"/>
+          </a:xfrm>
+          <a:prstGeom prst="rect">
+            <a:avLst/>
+          </a:prstGeom>
+          <a:solidFill>
+            <a:schemeClr val="bg1"/>
+          </a:solidFill>
+        </p:spPr>
+        <p:style>
+          <a:lnRef idx="2">
+            <a:schemeClr val="accent1">
+              <a:shade val="50000"/>
+            </a:schemeClr>
+          </a:lnRef>
+          <a:fillRef idx="1">
+            <a:schemeClr val="accent1"/>
+          </a:fillRef>
+          <a:effectRef idx="0">
+            <a:schemeClr val="accent1"/>
+          </a:effectRef>
+          <a:fontRef idx="minor">
+            <a:schemeClr val="lt1"/>
+          </a:fontRef>
+        </p:style>
+        <p:txBody>
+          <a:bodyPr rtlCol="0" anchor="ctr"/>
+          <a:lstStyle/>
+          <a:p>
+            <a:pPr algn="ctr"/>
+            <a:r>
+              <a:rPr lang="ru-RU" sz="1200" dirty="0" smtClean="0">
+                <a:ln>
+                  <a:solidFill>
+                    <a:schemeClr val="tx1"/>
+                  </a:solidFill>
+                </a:ln>
+                <a:solidFill>
+                  <a:schemeClr val="accent1">
+                    <a:lumMod val="75000"/>
+                  </a:schemeClr>
+                </a:solidFill>
+              </a:rPr>
+              <a:t>Т-триггер</a:t>
+            </a:r>
+            <a:endParaRPr lang="ru-RU" sz="1200" dirty="0">
+              <a:ln>
+                <a:solidFill>
+                  <a:schemeClr val="tx1"/>
+                </a:solidFill>
+              </a:ln>
+              <a:solidFill>
+                <a:schemeClr val="accent1">
+                  <a:lumMod val="75000"/>
+                </a:schemeClr>
+              </a:solidFill>
+            </a:endParaRPr>
+          </a:p>
+        </p:txBody>
+      </p:sp>
+      <p:sp>
+        <p:nvSpPr>
+          <p:cNvPr id="9" name="Прямоугольник 8"/>
+          <p:cNvSpPr/>
+          <p:nvPr/>
+        </p:nvSpPr>
+        <p:spPr>
+          <a:xfrm>
+            <a:off x="5587042" y="3963837"/>
+            <a:ext cx="862642" cy="181154"/>
+          </a:xfrm>
+          <a:prstGeom prst="rect">
+            <a:avLst/>
+          </a:prstGeom>
+          <a:solidFill>
+            <a:schemeClr val="bg1"/>
+          </a:solidFill>
+        </p:spPr>
+        <p:style>
+          <a:lnRef idx="2">
+            <a:schemeClr val="accent1">
+              <a:shade val="50000"/>
+            </a:schemeClr>
+          </a:lnRef>
+          <a:fillRef idx="1">
+            <a:schemeClr val="accent1"/>
+          </a:fillRef>
+          <a:effectRef idx="0">
+            <a:schemeClr val="accent1"/>
+          </a:effectRef>
+          <a:fontRef idx="minor">
+            <a:schemeClr val="lt1"/>
+          </a:fontRef>
+        </p:style>
+        <p:txBody>
+          <a:bodyPr rtlCol="0" anchor="ctr"/>
+          <a:lstStyle/>
+          <a:p>
+            <a:pPr algn="ctr"/>
+            <a:r>
+              <a:rPr lang="ru-RU" sz="1200" dirty="0" smtClean="0">
+                <a:ln>
+                  <a:solidFill>
+                    <a:schemeClr val="tx1"/>
+                  </a:solidFill>
+                </a:ln>
+                <a:solidFill>
+                  <a:schemeClr val="accent1">
+                    <a:lumMod val="75000"/>
+                  </a:schemeClr>
+                </a:solidFill>
+              </a:rPr>
+              <a:t>Т-триггер</a:t>
+            </a:r>
+            <a:endParaRPr lang="ru-RU" sz="1200" dirty="0">
+              <a:ln>
+                <a:solidFill>
+                  <a:schemeClr val="tx1"/>
+                </a:solidFill>
+              </a:ln>
+              <a:solidFill>
+                <a:schemeClr val="accent1">
+                  <a:lumMod val="75000"/>
+                </a:schemeClr>
+              </a:solidFill>
+            </a:endParaRPr>
+          </a:p>
+        </p:txBody>
+      </p:sp>
     </p:spTree>
     <p:extLst>
       <p:ext uri="{BB962C8B-B14F-4D97-AF65-F5344CB8AC3E}">
@@ -3800,6 +4214,144 @@
           </a:p>
         </p:txBody>
       </p:sp>
+      <p:sp>
+        <p:nvSpPr>
+          <p:cNvPr id="9" name="Прямоугольник 8"/>
+          <p:cNvSpPr/>
+          <p:nvPr/>
+        </p:nvSpPr>
+        <p:spPr>
+          <a:xfrm>
+            <a:off x="5357004" y="3878203"/>
+            <a:ext cx="862642" cy="181154"/>
+          </a:xfrm>
+          <a:prstGeom prst="rect">
+            <a:avLst/>
+          </a:prstGeom>
+          <a:solidFill>
+            <a:schemeClr val="bg1"/>
+          </a:solidFill>
+        </p:spPr>
+        <p:style>
+          <a:lnRef idx="2">
+            <a:schemeClr val="accent1">
+              <a:shade val="50000"/>
+            </a:schemeClr>
+          </a:lnRef>
+          <a:fillRef idx="1">
+            <a:schemeClr val="accent1"/>
+          </a:fillRef>
+          <a:effectRef idx="0">
+            <a:schemeClr val="accent1"/>
+          </a:effectRef>
+          <a:fontRef idx="minor">
+            <a:schemeClr val="lt1"/>
+          </a:fontRef>
+        </p:style>
+        <p:txBody>
+          <a:bodyPr rtlCol="0" anchor="ctr"/>
+          <a:lstStyle/>
+          <a:p>
+            <a:pPr algn="ctr"/>
+            <a:r>
+              <a:rPr lang="ru-RU" sz="1200" dirty="0" smtClean="0">
+                <a:ln>
+                  <a:solidFill>
+                    <a:schemeClr val="tx1"/>
+                  </a:solidFill>
+                </a:ln>
+                <a:solidFill>
+                  <a:schemeClr val="accent1">
+                    <a:lumMod val="75000"/>
+                  </a:schemeClr>
+                </a:solidFill>
+              </a:rPr>
+              <a:t>Т-триггер</a:t>
+            </a:r>
+            <a:endParaRPr lang="ru-RU" sz="1200" dirty="0">
+              <a:ln>
+                <a:solidFill>
+                  <a:schemeClr val="tx1"/>
+                </a:solidFill>
+              </a:ln>
+              <a:solidFill>
+                <a:schemeClr val="accent1">
+                  <a:lumMod val="75000"/>
+                </a:schemeClr>
+              </a:solidFill>
+            </a:endParaRPr>
+          </a:p>
+        </p:txBody>
+      </p:sp>
+      <p:sp>
+        <p:nvSpPr>
+          <p:cNvPr id="12" name="Прямоугольник 11"/>
+          <p:cNvSpPr/>
+          <p:nvPr/>
+        </p:nvSpPr>
+        <p:spPr>
+          <a:xfrm>
+            <a:off x="7027653" y="3878203"/>
+            <a:ext cx="862642" cy="181154"/>
+          </a:xfrm>
+          <a:prstGeom prst="rect">
+            <a:avLst/>
+          </a:prstGeom>
+          <a:solidFill>
+            <a:schemeClr val="bg1"/>
+          </a:solidFill>
+        </p:spPr>
+        <p:style>
+          <a:lnRef idx="2">
+            <a:schemeClr val="accent1">
+              <a:shade val="50000"/>
+            </a:schemeClr>
+          </a:lnRef>
+          <a:fillRef idx="1">
+            <a:schemeClr val="accent1"/>
+          </a:fillRef>
+          <a:effectRef idx="0">
+            <a:schemeClr val="accent1"/>
+          </a:effectRef>
+          <a:fontRef idx="minor">
+            <a:schemeClr val="lt1"/>
+          </a:fontRef>
+        </p:style>
+        <p:txBody>
+          <a:bodyPr rtlCol="0" anchor="ctr"/>
+          <a:lstStyle/>
+          <a:p>
+            <a:pPr algn="ctr"/>
+            <a:r>
+              <a:rPr lang="ru-RU" sz="1200" dirty="0" smtClean="0">
+                <a:ln>
+                  <a:solidFill>
+                    <a:schemeClr val="tx1"/>
+                  </a:solidFill>
+                </a:ln>
+                <a:solidFill>
+                  <a:schemeClr val="accent1">
+                    <a:lumMod val="75000"/>
+                  </a:schemeClr>
+                </a:solidFill>
+              </a:rPr>
+              <a:t>Т-триггер</a:t>
+            </a:r>
+            <a:endParaRPr lang="ru-RU" sz="1200" dirty="0">
+              <a:ln>
+                <a:solidFill>
+                  <a:schemeClr val="tx1"/>
+                </a:solidFill>
+              </a:ln>
+              <a:solidFill>
+                <a:schemeClr val="accent1">
+                  <a:lumMod val="75000"/>
+                </a:schemeClr>
+              </a:solidFill>
+            </a:endParaRPr>
+          </a:p>
+        </p:txBody>
+      </p:sp>
     </p:spTree>
     <p:extLst>
       <p:ext uri="{BB962C8B-B14F-4D97-AF65-F5344CB8AC3E}">
@@ -4057,6 +4609,144 @@
           </a:p>
         </p:txBody>
       </p:sp>
+      <p:sp>
+        <p:nvSpPr>
+          <p:cNvPr id="8" name="Прямоугольник 7"/>
+          <p:cNvSpPr/>
+          <p:nvPr/>
+        </p:nvSpPr>
+        <p:spPr>
+          <a:xfrm>
+            <a:off x="5287992" y="3981719"/>
+            <a:ext cx="862642" cy="181154"/>
+          </a:xfrm>
+          <a:prstGeom prst="rect">
+            <a:avLst/>
+          </a:prstGeom>
+          <a:solidFill>
+            <a:schemeClr val="bg1"/>
+          </a:solidFill>
+        </p:spPr>
+        <p:style>
+          <a:lnRef idx="2">
+            <a:schemeClr val="accent1">
+              <a:shade val="50000"/>
+            </a:schemeClr>
+          </a:lnRef>
+          <a:fillRef idx="1">
+            <a:schemeClr val="accent1"/>
+          </a:fillRef>
+          <a:effectRef idx="0">
+            <a:schemeClr val="accent1"/>
+          </a:effectRef>
+          <a:fontRef idx="minor">
+            <a:schemeClr val="lt1"/>
+          </a:fontRef>
+        </p:style>
+        <p:txBody>
+          <a:bodyPr rtlCol="0" anchor="ctr"/>
+          <a:lstStyle/>
+          <a:p>
+            <a:pPr algn="ctr"/>
+            <a:r>
+              <a:rPr lang="ru-RU" sz="1200" dirty="0" smtClean="0">
+                <a:ln>
+                  <a:solidFill>
+                    <a:schemeClr val="tx1"/>
+                  </a:solidFill>
+                </a:ln>
+                <a:solidFill>
+                  <a:schemeClr val="accent1">
+                    <a:lumMod val="75000"/>
+                  </a:schemeClr>
+                </a:solidFill>
+              </a:rPr>
+              <a:t>Т-триггер</a:t>
+            </a:r>
+            <a:endParaRPr lang="ru-RU" sz="1200" dirty="0">
+              <a:ln>
+                <a:solidFill>
+                  <a:schemeClr val="tx1"/>
+                </a:solidFill>
+              </a:ln>
+              <a:solidFill>
+                <a:schemeClr val="accent1">
+                  <a:lumMod val="75000"/>
+                </a:schemeClr>
+              </a:solidFill>
+            </a:endParaRPr>
+          </a:p>
+        </p:txBody>
+      </p:sp>
+      <p:sp>
+        <p:nvSpPr>
+          <p:cNvPr id="10" name="Прямоугольник 9"/>
+          <p:cNvSpPr/>
+          <p:nvPr/>
+        </p:nvSpPr>
+        <p:spPr>
+          <a:xfrm>
+            <a:off x="7194429" y="3981719"/>
+            <a:ext cx="862642" cy="181154"/>
+          </a:xfrm>
+          <a:prstGeom prst="rect">
+            <a:avLst/>
+          </a:prstGeom>
+          <a:solidFill>
+            <a:schemeClr val="bg1"/>
+          </a:solidFill>
+        </p:spPr>
+        <p:style>
+          <a:lnRef idx="2">
+            <a:schemeClr val="accent1">
+              <a:shade val="50000"/>
+            </a:schemeClr>
+          </a:lnRef>
+          <a:fillRef idx="1">
+            <a:schemeClr val="accent1"/>
+          </a:fillRef>
+          <a:effectRef idx="0">
+            <a:schemeClr val="accent1"/>
+          </a:effectRef>
+          <a:fontRef idx="minor">
+            <a:schemeClr val="lt1"/>
+          </a:fontRef>
+        </p:style>
+        <p:txBody>
+          <a:bodyPr rtlCol="0" anchor="ctr"/>
+          <a:lstStyle/>
+          <a:p>
+            <a:pPr algn="ctr"/>
+            <a:r>
+              <a:rPr lang="ru-RU" sz="1200" dirty="0" smtClean="0">
+                <a:ln>
+                  <a:solidFill>
+                    <a:schemeClr val="tx1"/>
+                  </a:solidFill>
+                </a:ln>
+                <a:solidFill>
+                  <a:schemeClr val="accent1">
+                    <a:lumMod val="75000"/>
+                  </a:schemeClr>
+                </a:solidFill>
+              </a:rPr>
+              <a:t>Т-триггер</a:t>
+            </a:r>
+            <a:endParaRPr lang="ru-RU" sz="1200" dirty="0">
+              <a:ln>
+                <a:solidFill>
+                  <a:schemeClr val="tx1"/>
+                </a:solidFill>
+              </a:ln>
+              <a:solidFill>
+                <a:schemeClr val="accent1">
+                  <a:lumMod val="75000"/>
+                </a:schemeClr>
+              </a:solidFill>
+            </a:endParaRPr>
+          </a:p>
+        </p:txBody>
+      </p:sp>
     </p:spTree>
     <p:extLst>
       <p:ext uri="{BB962C8B-B14F-4D97-AF65-F5344CB8AC3E}">
@@ -4251,6 +4941,144 @@
           </a:prstGeom>
         </p:spPr>
       </p:pic>
+      <p:sp>
+        <p:nvSpPr>
+          <p:cNvPr id="8" name="Прямоугольник 7"/>
+          <p:cNvSpPr/>
+          <p:nvPr/>
+        </p:nvSpPr>
+        <p:spPr>
+          <a:xfrm>
+            <a:off x="5193102" y="4093863"/>
+            <a:ext cx="862642" cy="181154"/>
+          </a:xfrm>
+          <a:prstGeom prst="rect">
+            <a:avLst/>
+          </a:prstGeom>
+          <a:solidFill>
+            <a:schemeClr val="bg1"/>
+          </a:solidFill>
+        </p:spPr>
+        <p:style>
+          <a:lnRef idx="2">
+            <a:schemeClr val="accent1">
+              <a:shade val="50000"/>
+            </a:schemeClr>
+          </a:lnRef>
+          <a:fillRef idx="1">
+            <a:schemeClr val="accent1"/>
+          </a:fillRef>
+          <a:effectRef idx="0">
+            <a:schemeClr val="accent1"/>
+          </a:effectRef>
+          <a:fontRef idx="minor">
+            <a:schemeClr val="lt1"/>
+          </a:fontRef>
+        </p:style>
+        <p:txBody>
+          <a:bodyPr rtlCol="0" anchor="ctr"/>
+          <a:lstStyle/>
+          <a:p>
+            <a:pPr algn="ctr"/>
+            <a:r>
+              <a:rPr lang="ru-RU" sz="1200" dirty="0" smtClean="0">
+                <a:ln>
+                  <a:solidFill>
+                    <a:schemeClr val="tx1"/>
+                  </a:solidFill>
+                </a:ln>
+                <a:solidFill>
+                  <a:schemeClr val="accent1">
+                    <a:lumMod val="75000"/>
+                  </a:schemeClr>
+                </a:solidFill>
+              </a:rPr>
+              <a:t>Т-триггер</a:t>
+            </a:r>
+            <a:endParaRPr lang="ru-RU" sz="1200" dirty="0">
+              <a:ln>
+                <a:solidFill>
+                  <a:schemeClr val="tx1"/>
+                </a:solidFill>
+              </a:ln>
+              <a:solidFill>
+                <a:schemeClr val="accent1">
+                  <a:lumMod val="75000"/>
+                </a:schemeClr>
+              </a:solidFill>
+            </a:endParaRPr>
+          </a:p>
+        </p:txBody>
+      </p:sp>
+      <p:sp>
+        <p:nvSpPr>
+          <p:cNvPr id="10" name="Прямоугольник 9"/>
+          <p:cNvSpPr/>
+          <p:nvPr/>
+        </p:nvSpPr>
+        <p:spPr>
+          <a:xfrm>
+            <a:off x="7142672" y="4093863"/>
+            <a:ext cx="862642" cy="181154"/>
+          </a:xfrm>
+          <a:prstGeom prst="rect">
+            <a:avLst/>
+          </a:prstGeom>
+          <a:solidFill>
+            <a:schemeClr val="bg1"/>
+          </a:solidFill>
+        </p:spPr>
+        <p:style>
+          <a:lnRef idx="2">
+            <a:schemeClr val="accent1">
+              <a:shade val="50000"/>
+            </a:schemeClr>
+          </a:lnRef>
+          <a:fillRef idx="1">
+            <a:schemeClr val="accent1"/>
+          </a:fillRef>
+          <a:effectRef idx="0">
+            <a:schemeClr val="accent1"/>
+          </a:effectRef>
+          <a:fontRef idx="minor">
+            <a:schemeClr val="lt1"/>
+          </a:fontRef>
+        </p:style>
+        <p:txBody>
+          <a:bodyPr rtlCol="0" anchor="ctr"/>
+          <a:lstStyle/>
+          <a:p>
+            <a:pPr algn="ctr"/>
+            <a:r>
+              <a:rPr lang="ru-RU" sz="1200" dirty="0" smtClean="0">
+                <a:ln>
+                  <a:solidFill>
+                    <a:schemeClr val="tx1"/>
+                  </a:solidFill>
+                </a:ln>
+                <a:solidFill>
+                  <a:schemeClr val="accent1">
+                    <a:lumMod val="75000"/>
+                  </a:schemeClr>
+                </a:solidFill>
+              </a:rPr>
+              <a:t>Т-триггер</a:t>
+            </a:r>
+            <a:endParaRPr lang="ru-RU" sz="1200" dirty="0">
+              <a:ln>
+                <a:solidFill>
+                  <a:schemeClr val="tx1"/>
+                </a:solidFill>
+              </a:ln>
+              <a:solidFill>
+                <a:schemeClr val="accent1">
+                  <a:lumMod val="75000"/>
+                </a:schemeClr>
+              </a:solidFill>
+            </a:endParaRPr>
+          </a:p>
+        </p:txBody>
+      </p:sp>
     </p:spTree>
     <p:extLst>
       <p:ext uri="{BB962C8B-B14F-4D97-AF65-F5344CB8AC3E}">
@@ -4281,9 +5109,78 @@
           <a:chExt cx="0" cy="0"/>
         </a:xfrm>
       </p:grpSpPr>
+      <p:sp>
+        <p:nvSpPr>
+          <p:cNvPr id="3" name="Прямоугольник 2"/>
+          <p:cNvSpPr/>
+          <p:nvPr/>
+        </p:nvSpPr>
+        <p:spPr>
+          <a:xfrm>
+            <a:off x="3502325" y="2670505"/>
+            <a:ext cx="862642" cy="181154"/>
+          </a:xfrm>
+          <a:prstGeom prst="rect">
+            <a:avLst/>
+          </a:prstGeom>
+          <a:solidFill>
+            <a:schemeClr val="bg1"/>
+          </a:solidFill>
+        </p:spPr>
+        <p:style>
+          <a:lnRef idx="2">
+            <a:schemeClr val="accent1">
+              <a:shade val="50000"/>
+            </a:schemeClr>
+          </a:lnRef>
+          <a:fillRef idx="1">
+            <a:schemeClr val="accent1"/>
+          </a:fillRef>
+          <a:effectRef idx="0">
+            <a:schemeClr val="accent1"/>
+          </a:effectRef>
+          <a:fontRef idx="minor">
+            <a:schemeClr val="lt1"/>
+          </a:fontRef>
+        </p:style>
+        <p:txBody>
+          <a:bodyPr rtlCol="0" anchor="ctr"/>
+          <a:lstStyle/>
+          <a:p>
+            <a:pPr algn="ctr"/>
+            <a:r>
+              <a:rPr lang="ru-RU" sz="1200" dirty="0" smtClean="0">
+                <a:ln>
+                  <a:solidFill>
+                    <a:schemeClr val="tx1"/>
+                  </a:solidFill>
+                </a:ln>
+                <a:solidFill>
+                  <a:schemeClr val="accent1">
+                    <a:lumMod val="75000"/>
+                  </a:schemeClr>
+                </a:solidFill>
+              </a:rPr>
+              <a:t>Т-триггер</a:t>
+            </a:r>
+            <a:endParaRPr lang="ru-RU" sz="1200" dirty="0">
+              <a:ln>
+                <a:solidFill>
+                  <a:schemeClr val="tx1"/>
+                </a:solidFill>
+              </a:ln>
+              <a:solidFill>
+                <a:schemeClr val="accent1">
+                  <a:lumMod val="75000"/>
+                </a:schemeClr>
+              </a:solidFill>
+            </a:endParaRPr>
+          </a:p>
+        </p:txBody>
+      </p:sp>
       <p:pic>
         <p:nvPicPr>
-          <p:cNvPr id="5" name="Рисунок 4"/>
+          <p:cNvPr id="2" name="Рисунок 1"/>
           <p:cNvPicPr>
             <a:picLocks noChangeAspect="1"/>
           </p:cNvPicPr>
@@ -4297,8 +5194,8 @@
         </p:blipFill>
         <p:spPr>
           <a:xfrm>
-            <a:off x="808681" y="1143000"/>
-            <a:ext cx="10324079" cy="4572000"/>
+            <a:off x="590302" y="491704"/>
+            <a:ext cx="10143833" cy="5134209"/>
           </a:xfrm>
           <a:prstGeom prst="rect">
             <a:avLst/>

</xml_diff>